<commit_message>
Update API example (#6)
</commit_message>
<xml_diff>
--- a/presentations/5-MODFLOW_API.pptx
+++ b/presentations/5-MODFLOW_API.pptx
@@ -5,11 +5,12 @@
     <p:sldMasterId id="2147483648" r:id="rId1"/>
   </p:sldMasterIdLst>
   <p:notesMasterIdLst>
-    <p:notesMasterId r:id="rId4"/>
+    <p:notesMasterId r:id="rId5"/>
   </p:notesMasterIdLst>
   <p:sldIdLst>
     <p:sldId id="256" r:id="rId2"/>
     <p:sldId id="1366" r:id="rId3"/>
+    <p:sldId id="1367" r:id="rId4"/>
   </p:sldIdLst>
   <p:sldSz cx="12192000" cy="6858000"/>
   <p:notesSz cx="6858000" cy="9144000"/>
@@ -198,7 +199,7 @@
           <a:p>
             <a:fld id="{C0C5AD05-AA96-9E45-ACD0-85B9A9AECD2E}" type="datetimeFigureOut">
               <a:rPr lang="en-US" smtClean="0"/>
-              <a:t>11/18/2024</a:t>
+              <a:t>11/20/24</a:t>
             </a:fld>
             <a:endParaRPr lang="en-US"/>
           </a:p>
@@ -612,7 +613,7 @@
           <a:p>
             <a:fld id="{2BE7F1A7-46C0-614C-8973-2677197B1A3C}" type="datetimeFigureOut">
               <a:rPr lang="en-US" smtClean="0"/>
-              <a:t>11/18/2024</a:t>
+              <a:t>11/20/24</a:t>
             </a:fld>
             <a:endParaRPr lang="en-US"/>
           </a:p>
@@ -810,7 +811,7 @@
           <a:p>
             <a:fld id="{2BE7F1A7-46C0-614C-8973-2677197B1A3C}" type="datetimeFigureOut">
               <a:rPr lang="en-US" smtClean="0"/>
-              <a:t>11/18/2024</a:t>
+              <a:t>11/20/24</a:t>
             </a:fld>
             <a:endParaRPr lang="en-US"/>
           </a:p>
@@ -1018,7 +1019,7 @@
           <a:p>
             <a:fld id="{2BE7F1A7-46C0-614C-8973-2677197B1A3C}" type="datetimeFigureOut">
               <a:rPr lang="en-US" smtClean="0"/>
-              <a:t>11/18/2024</a:t>
+              <a:t>11/20/24</a:t>
             </a:fld>
             <a:endParaRPr lang="en-US"/>
           </a:p>
@@ -1216,7 +1217,7 @@
           <a:p>
             <a:fld id="{2BE7F1A7-46C0-614C-8973-2677197B1A3C}" type="datetimeFigureOut">
               <a:rPr lang="en-US" smtClean="0"/>
-              <a:t>11/18/2024</a:t>
+              <a:t>11/20/24</a:t>
             </a:fld>
             <a:endParaRPr lang="en-US"/>
           </a:p>
@@ -1491,7 +1492,7 @@
           <a:p>
             <a:fld id="{2BE7F1A7-46C0-614C-8973-2677197B1A3C}" type="datetimeFigureOut">
               <a:rPr lang="en-US" smtClean="0"/>
-              <a:t>11/18/2024</a:t>
+              <a:t>11/20/24</a:t>
             </a:fld>
             <a:endParaRPr lang="en-US"/>
           </a:p>
@@ -1756,7 +1757,7 @@
           <a:p>
             <a:fld id="{2BE7F1A7-46C0-614C-8973-2677197B1A3C}" type="datetimeFigureOut">
               <a:rPr lang="en-US" smtClean="0"/>
-              <a:t>11/18/2024</a:t>
+              <a:t>11/20/24</a:t>
             </a:fld>
             <a:endParaRPr lang="en-US"/>
           </a:p>
@@ -2168,7 +2169,7 @@
           <a:p>
             <a:fld id="{2BE7F1A7-46C0-614C-8973-2677197B1A3C}" type="datetimeFigureOut">
               <a:rPr lang="en-US" smtClean="0"/>
-              <a:t>11/18/2024</a:t>
+              <a:t>11/20/24</a:t>
             </a:fld>
             <a:endParaRPr lang="en-US"/>
           </a:p>
@@ -2309,7 +2310,7 @@
           <a:p>
             <a:fld id="{2BE7F1A7-46C0-614C-8973-2677197B1A3C}" type="datetimeFigureOut">
               <a:rPr lang="en-US" smtClean="0"/>
-              <a:t>11/18/2024</a:t>
+              <a:t>11/20/24</a:t>
             </a:fld>
             <a:endParaRPr lang="en-US"/>
           </a:p>
@@ -2422,7 +2423,7 @@
           <a:p>
             <a:fld id="{2BE7F1A7-46C0-614C-8973-2677197B1A3C}" type="datetimeFigureOut">
               <a:rPr lang="en-US" smtClean="0"/>
-              <a:t>11/18/2024</a:t>
+              <a:t>11/20/24</a:t>
             </a:fld>
             <a:endParaRPr lang="en-US"/>
           </a:p>
@@ -2733,7 +2734,7 @@
           <a:p>
             <a:fld id="{2BE7F1A7-46C0-614C-8973-2677197B1A3C}" type="datetimeFigureOut">
               <a:rPr lang="en-US" smtClean="0"/>
-              <a:t>11/18/2024</a:t>
+              <a:t>11/20/24</a:t>
             </a:fld>
             <a:endParaRPr lang="en-US"/>
           </a:p>
@@ -3021,7 +3022,7 @@
           <a:p>
             <a:fld id="{2BE7F1A7-46C0-614C-8973-2677197B1A3C}" type="datetimeFigureOut">
               <a:rPr lang="en-US" smtClean="0"/>
-              <a:t>11/18/2024</a:t>
+              <a:t>11/20/24</a:t>
             </a:fld>
             <a:endParaRPr lang="en-US"/>
           </a:p>
@@ -3262,7 +3263,7 @@
           <a:p>
             <a:fld id="{2BE7F1A7-46C0-614C-8973-2677197B1A3C}" type="datetimeFigureOut">
               <a:rPr lang="en-US" smtClean="0"/>
-              <a:t>11/18/2024</a:t>
+              <a:t>11/20/24</a:t>
             </a:fld>
             <a:endParaRPr lang="en-US"/>
           </a:p>
@@ -4327,7 +4328,7 @@
           <a:noFill/>
           <a:extLst>
             <a:ext uri="{909E8E84-426E-40dd-AFC4-6F175D3DCCD1}">
-              <a14:hiddenFill xmlns:a14="http://schemas.microsoft.com/office/drawing/2010/main" xmlns="">
+              <a14:hiddenFill xmlns="" xmlns:a14="http://schemas.microsoft.com/office/drawing/2010/main">
                 <a:solidFill>
                   <a:srgbClr val="FFFFFF"/>
                 </a:solidFill>
@@ -4728,45 +4729,173 @@
             <p:ph idx="1"/>
           </p:nvPr>
         </p:nvSpPr>
+        <p:spPr>
+          <a:xfrm>
+            <a:off x="838200" y="1825625"/>
+            <a:ext cx="6797091" cy="4351338"/>
+          </a:xfrm>
+        </p:spPr>
+        <p:txBody>
+          <a:bodyPr>
+            <a:normAutofit fontScale="92500" lnSpcReduction="20000"/>
+          </a:bodyPr>
+          <a:lstStyle/>
+          <a:p>
+            <a:r>
+              <a:rPr lang="en-US" dirty="0"/>
+              <a:t>Full control of MODFLOW while it’s running</a:t>
+            </a:r>
+          </a:p>
+          <a:p>
+            <a:r>
+              <a:rPr lang="en-US" dirty="0"/>
+              <a:t>Well-defined interfaces based on Basic Model Interface (BMI) standard</a:t>
+            </a:r>
+          </a:p>
+          <a:p>
+            <a:r>
+              <a:rPr lang="en-US" dirty="0"/>
+              <a:t>Access to MODFLOW internal variables at runtime</a:t>
+            </a:r>
+          </a:p>
+          <a:p>
+            <a:r>
+              <a:rPr lang="en-US" dirty="0"/>
+              <a:t>Uses a shared library (DLL) version of MODFLOW 6 based on the same code as the executable version</a:t>
+            </a:r>
+          </a:p>
+          <a:p>
+            <a:r>
+              <a:rPr lang="en-US" dirty="0"/>
+              <a:t>API use cases</a:t>
+            </a:r>
+          </a:p>
+          <a:p>
+            <a:pPr lvl="1"/>
+            <a:r>
+              <a:rPr lang="en-US" dirty="0"/>
+              <a:t>Couple MODFLOW with another model</a:t>
+            </a:r>
+          </a:p>
+          <a:p>
+            <a:pPr lvl="1"/>
+            <a:r>
+              <a:rPr lang="en-US" dirty="0"/>
+              <a:t>Prototype or develop new MODFLOW packages</a:t>
+            </a:r>
+          </a:p>
+          <a:p>
+            <a:pPr lvl="1"/>
+            <a:r>
+              <a:rPr lang="en-US" dirty="0"/>
+              <a:t>“Observe” MODFLOW behavior during a simulation</a:t>
+            </a:r>
+          </a:p>
+          <a:p>
+            <a:endParaRPr lang="en-US" dirty="0"/>
+          </a:p>
+        </p:txBody>
+      </p:sp>
+      <p:sp>
+        <p:nvSpPr>
+          <p:cNvPr id="5" name="Title 4">
+            <a:extLst>
+              <a:ext uri="{FF2B5EF4-FFF2-40B4-BE49-F238E27FC236}">
+                <a16:creationId xmlns:a16="http://schemas.microsoft.com/office/drawing/2014/main" id="{C4C64AFA-1207-A282-D9BA-77418E5922A3}"/>
+              </a:ext>
+            </a:extLst>
+          </p:cNvPr>
+          <p:cNvSpPr>
+            <a:spLocks noGrp="1"/>
+          </p:cNvSpPr>
+          <p:nvPr>
+            <p:ph type="title"/>
+          </p:nvPr>
+        </p:nvSpPr>
         <p:spPr/>
         <p:txBody>
-          <a:bodyPr>
-            <a:normAutofit/>
+          <a:bodyPr/>
+          <a:lstStyle/>
+          <a:p>
+            <a:r>
+              <a:rPr lang="nl-NL" dirty="0"/>
+              <a:t>MODFLOW API</a:t>
+            </a:r>
+          </a:p>
+        </p:txBody>
+      </p:sp>
+      <p:pic>
+        <p:nvPicPr>
+          <p:cNvPr id="2" name="Picture 1">
+            <a:extLst>
+              <a:ext uri="{FF2B5EF4-FFF2-40B4-BE49-F238E27FC236}">
+                <a16:creationId xmlns:a16="http://schemas.microsoft.com/office/drawing/2014/main" id="{A1AE3AE7-2E36-CFE5-D692-8BC5F9DBD0FD}"/>
+              </a:ext>
+            </a:extLst>
+          </p:cNvPr>
+          <p:cNvPicPr>
+            <a:picLocks noChangeAspect="1"/>
+          </p:cNvPicPr>
+          <p:nvPr/>
+        </p:nvPicPr>
+        <p:blipFill>
+          <a:blip r:embed="rId2"/>
+          <a:stretch>
+            <a:fillRect/>
+          </a:stretch>
+        </p:blipFill>
+        <p:spPr>
+          <a:xfrm>
+            <a:off x="7635291" y="561916"/>
+            <a:ext cx="4236619" cy="5667768"/>
+          </a:xfrm>
+          <a:prstGeom prst="rect">
+            <a:avLst/>
+          </a:prstGeom>
+          <a:ln>
+            <a:solidFill>
+              <a:schemeClr val="tx1"/>
+            </a:solidFill>
+          </a:ln>
+        </p:spPr>
+      </p:pic>
+      <p:sp>
+        <p:nvSpPr>
+          <p:cNvPr id="4" name="TextBox 3">
+            <a:extLst>
+              <a:ext uri="{FF2B5EF4-FFF2-40B4-BE49-F238E27FC236}">
+                <a16:creationId xmlns:a16="http://schemas.microsoft.com/office/drawing/2014/main" id="{CEEBFDC0-3519-E4B6-017B-55790C364DB4}"/>
+              </a:ext>
+            </a:extLst>
+          </p:cNvPr>
+          <p:cNvSpPr txBox="1"/>
+          <p:nvPr/>
+        </p:nvSpPr>
+        <p:spPr>
+          <a:xfrm>
+            <a:off x="8790644" y="6281119"/>
+            <a:ext cx="2066976" cy="369332"/>
+          </a:xfrm>
+          <a:prstGeom prst="rect">
+            <a:avLst/>
+          </a:prstGeom>
+          <a:noFill/>
+        </p:spPr>
+        <p:txBody>
+          <a:bodyPr wrap="none" rtlCol="0">
+            <a:spAutoFit/>
           </a:bodyPr>
           <a:lstStyle/>
           <a:p>
             <a:r>
-              <a:rPr lang="en-US"/>
-              <a:t>points</a:t>
-            </a:r>
-            <a:endParaRPr lang="en-US" dirty="0"/>
-          </a:p>
-        </p:txBody>
-      </p:sp>
-      <p:sp>
-        <p:nvSpPr>
-          <p:cNvPr id="5" name="Title 4">
-            <a:extLst>
-              <a:ext uri="{FF2B5EF4-FFF2-40B4-BE49-F238E27FC236}">
-                <a16:creationId xmlns:a16="http://schemas.microsoft.com/office/drawing/2014/main" id="{C4C64AFA-1207-A282-D9BA-77418E5922A3}"/>
-              </a:ext>
-            </a:extLst>
-          </p:cNvPr>
-          <p:cNvSpPr>
-            <a:spLocks noGrp="1"/>
-          </p:cNvSpPr>
-          <p:nvPr>
-            <p:ph type="title"/>
-          </p:nvPr>
-        </p:nvSpPr>
-        <p:spPr/>
-        <p:txBody>
-          <a:bodyPr/>
-          <a:lstStyle/>
-          <a:p>
-            <a:r>
-              <a:rPr lang="nl-NL"/>
-              <a:t>Title</a:t>
+              <a:rPr lang="en-US" dirty="0">
+                <a:hlinkClick r:id="rId3"/>
+              </a:rPr>
+              <a:t>Hughes et al. (2022</a:t>
+            </a:r>
+            <a:r>
+              <a:rPr lang="en-US" dirty="0"/>
+              <a:t>)</a:t>
             </a:r>
           </a:p>
         </p:txBody>
@@ -4781,6 +4910,458 @@
   <p:clrMapOvr>
     <a:masterClrMapping/>
   </p:clrMapOvr>
+</p:sld>
+</file>
+
+<file path=ppt/slides/slide3.xml><?xml version="1.0" encoding="utf-8"?>
+<p:sld xmlns:a="http://schemas.openxmlformats.org/drawingml/2006/main" xmlns:r="http://schemas.openxmlformats.org/officeDocument/2006/relationships" xmlns:p="http://schemas.openxmlformats.org/presentationml/2006/main">
+  <p:cSld>
+    <p:spTree>
+      <p:nvGrpSpPr>
+        <p:cNvPr id="1" name="">
+          <a:extLst>
+            <a:ext uri="{FF2B5EF4-FFF2-40B4-BE49-F238E27FC236}">
+              <a16:creationId xmlns:a16="http://schemas.microsoft.com/office/drawing/2014/main" id="{27AD7E5C-C1A2-7584-53E4-AB10E842925D}"/>
+            </a:ext>
+          </a:extLst>
+        </p:cNvPr>
+        <p:cNvGrpSpPr/>
+        <p:nvPr/>
+      </p:nvGrpSpPr>
+      <p:grpSpPr>
+        <a:xfrm>
+          <a:off x="0" y="0"/>
+          <a:ext cx="0" cy="0"/>
+          <a:chOff x="0" y="0"/>
+          <a:chExt cx="0" cy="0"/>
+        </a:xfrm>
+      </p:grpSpPr>
+      <p:sp>
+        <p:nvSpPr>
+          <p:cNvPr id="3" name="Content Placeholder 2">
+            <a:extLst>
+              <a:ext uri="{FF2B5EF4-FFF2-40B4-BE49-F238E27FC236}">
+                <a16:creationId xmlns:a16="http://schemas.microsoft.com/office/drawing/2014/main" id="{0F582B73-CF18-49C8-2E6E-8FA92538A380}"/>
+              </a:ext>
+            </a:extLst>
+          </p:cNvPr>
+          <p:cNvSpPr>
+            <a:spLocks noGrp="1"/>
+          </p:cNvSpPr>
+          <p:nvPr>
+            <p:ph idx="1"/>
+          </p:nvPr>
+        </p:nvSpPr>
+        <p:spPr>
+          <a:xfrm>
+            <a:off x="838201" y="1825625"/>
+            <a:ext cx="5800344" cy="4351338"/>
+          </a:xfrm>
+        </p:spPr>
+        <p:txBody>
+          <a:bodyPr>
+            <a:normAutofit fontScale="92500" lnSpcReduction="10000"/>
+          </a:bodyPr>
+          <a:lstStyle/>
+          <a:p>
+            <a:r>
+              <a:rPr lang="en-US" dirty="0"/>
+              <a:t>Modify the behavior of the river package to alter the conductance in gaining reaches</a:t>
+            </a:r>
+          </a:p>
+          <a:p>
+            <a:r>
+              <a:rPr lang="en-US" dirty="0"/>
+              <a:t>Inspired by </a:t>
+            </a:r>
+            <a:r>
+              <a:rPr lang="en-US" dirty="0">
+                <a:hlinkClick r:id="rId2"/>
+              </a:rPr>
+              <a:t>Zaadnoordijk (2009)</a:t>
+            </a:r>
+            <a:r>
+              <a:rPr lang="en-US" dirty="0"/>
+              <a:t>, which used a combination of a general head and drain boundaries to increase the conductance when the aquifer is discharging to the river</a:t>
+            </a:r>
+          </a:p>
+          <a:p>
+            <a:r>
+              <a:rPr lang="en-US" dirty="0"/>
+              <a:t>Observe simulated results at runtime</a:t>
+            </a:r>
+          </a:p>
+          <a:p>
+            <a:r>
+              <a:rPr lang="en-US" dirty="0"/>
+              <a:t>Use the </a:t>
+            </a:r>
+            <a:r>
+              <a:rPr lang="en-US" dirty="0" err="1"/>
+              <a:t>modflowapi</a:t>
+            </a:r>
+            <a:r>
+              <a:rPr lang="en-US" dirty="0"/>
+              <a:t> python package</a:t>
+            </a:r>
+          </a:p>
+          <a:p>
+            <a:pPr lvl="1"/>
+            <a:r>
+              <a:rPr lang="en-US" dirty="0"/>
+              <a:t>Access internal variables</a:t>
+            </a:r>
+          </a:p>
+          <a:p>
+            <a:pPr lvl="1"/>
+            <a:r>
+              <a:rPr lang="en-US" dirty="0"/>
+              <a:t>Control execution of MODFLOW</a:t>
+            </a:r>
+          </a:p>
+        </p:txBody>
+      </p:sp>
+      <p:sp>
+        <p:nvSpPr>
+          <p:cNvPr id="5" name="Title 4">
+            <a:extLst>
+              <a:ext uri="{FF2B5EF4-FFF2-40B4-BE49-F238E27FC236}">
+                <a16:creationId xmlns:a16="http://schemas.microsoft.com/office/drawing/2014/main" id="{860219C2-A30E-2E90-BDDA-8D7C501002BA}"/>
+              </a:ext>
+            </a:extLst>
+          </p:cNvPr>
+          <p:cNvSpPr>
+            <a:spLocks noGrp="1"/>
+          </p:cNvSpPr>
+          <p:nvPr>
+            <p:ph type="title"/>
+          </p:nvPr>
+        </p:nvSpPr>
+        <p:spPr/>
+        <p:txBody>
+          <a:bodyPr/>
+          <a:lstStyle/>
+          <a:p>
+            <a:r>
+              <a:rPr lang="nl-NL" dirty="0"/>
+              <a:t>MODFLOW API</a:t>
+            </a:r>
+          </a:p>
+        </p:txBody>
+      </p:sp>
+      <p:pic>
+        <p:nvPicPr>
+          <p:cNvPr id="2" name="Picture 1">
+            <a:extLst>
+              <a:ext uri="{FF2B5EF4-FFF2-40B4-BE49-F238E27FC236}">
+                <a16:creationId xmlns:a16="http://schemas.microsoft.com/office/drawing/2014/main" id="{6CCADA72-3134-CB96-BEF1-27D3D7600753}"/>
+              </a:ext>
+            </a:extLst>
+          </p:cNvPr>
+          <p:cNvPicPr>
+            <a:picLocks noChangeAspect="1"/>
+          </p:cNvPicPr>
+          <p:nvPr/>
+        </p:nvPicPr>
+        <p:blipFill>
+          <a:blip r:embed="rId3"/>
+          <a:stretch>
+            <a:fillRect/>
+          </a:stretch>
+        </p:blipFill>
+        <p:spPr>
+          <a:xfrm>
+            <a:off x="6509613" y="681037"/>
+            <a:ext cx="5450389" cy="2364988"/>
+          </a:xfrm>
+          <a:prstGeom prst="rect">
+            <a:avLst/>
+          </a:prstGeom>
+        </p:spPr>
+      </p:pic>
+      <p:pic>
+        <p:nvPicPr>
+          <p:cNvPr id="4" name="Picture 3">
+            <a:extLst>
+              <a:ext uri="{FF2B5EF4-FFF2-40B4-BE49-F238E27FC236}">
+                <a16:creationId xmlns:a16="http://schemas.microsoft.com/office/drawing/2014/main" id="{1C6CC31D-45B8-1E2E-CFA5-1229E14B53CA}"/>
+              </a:ext>
+            </a:extLst>
+          </p:cNvPr>
+          <p:cNvPicPr>
+            <a:picLocks noChangeAspect="1"/>
+          </p:cNvPicPr>
+          <p:nvPr/>
+        </p:nvPicPr>
+        <p:blipFill>
+          <a:blip r:embed="rId4"/>
+          <a:stretch>
+            <a:fillRect/>
+          </a:stretch>
+        </p:blipFill>
+        <p:spPr>
+          <a:xfrm>
+            <a:off x="6638544" y="3642627"/>
+            <a:ext cx="5192526" cy="2364988"/>
+          </a:xfrm>
+          <a:prstGeom prst="rect">
+            <a:avLst/>
+          </a:prstGeom>
+        </p:spPr>
+      </p:pic>
+      <p:sp>
+        <p:nvSpPr>
+          <p:cNvPr id="6" name="TextBox 5">
+            <a:extLst>
+              <a:ext uri="{FF2B5EF4-FFF2-40B4-BE49-F238E27FC236}">
+                <a16:creationId xmlns:a16="http://schemas.microsoft.com/office/drawing/2014/main" id="{E204BAAC-C9C3-DB4D-969B-69CD8E95B3C2}"/>
+              </a:ext>
+            </a:extLst>
+          </p:cNvPr>
+          <p:cNvSpPr txBox="1"/>
+          <p:nvPr/>
+        </p:nvSpPr>
+        <p:spPr>
+          <a:xfrm>
+            <a:off x="8654548" y="3046025"/>
+            <a:ext cx="1160519" cy="461665"/>
+          </a:xfrm>
+          <a:prstGeom prst="rect">
+            <a:avLst/>
+          </a:prstGeom>
+          <a:noFill/>
+        </p:spPr>
+        <p:txBody>
+          <a:bodyPr wrap="square" rtlCol="0">
+            <a:spAutoFit/>
+          </a:bodyPr>
+          <a:lstStyle/>
+          <a:p>
+            <a:pPr algn="ctr"/>
+            <a:r>
+              <a:rPr lang="en-US" sz="2400" dirty="0">
+                <a:solidFill>
+                  <a:srgbClr val="00B0F0"/>
+                </a:solidFill>
+              </a:rPr>
+              <a:t>gaining</a:t>
+            </a:r>
+          </a:p>
+        </p:txBody>
+      </p:sp>
+      <p:sp>
+        <p:nvSpPr>
+          <p:cNvPr id="7" name="TextBox 6">
+            <a:extLst>
+              <a:ext uri="{FF2B5EF4-FFF2-40B4-BE49-F238E27FC236}">
+                <a16:creationId xmlns:a16="http://schemas.microsoft.com/office/drawing/2014/main" id="{77B6B091-231B-63B1-1A27-23FB1A2067A6}"/>
+              </a:ext>
+            </a:extLst>
+          </p:cNvPr>
+          <p:cNvSpPr txBox="1"/>
+          <p:nvPr/>
+        </p:nvSpPr>
+        <p:spPr>
+          <a:xfrm>
+            <a:off x="8654548" y="6135969"/>
+            <a:ext cx="1160519" cy="461665"/>
+          </a:xfrm>
+          <a:prstGeom prst="rect">
+            <a:avLst/>
+          </a:prstGeom>
+          <a:noFill/>
+        </p:spPr>
+        <p:txBody>
+          <a:bodyPr wrap="square" rtlCol="0">
+            <a:spAutoFit/>
+          </a:bodyPr>
+          <a:lstStyle/>
+          <a:p>
+            <a:pPr algn="ctr"/>
+            <a:r>
+              <a:rPr lang="en-US" sz="2400" dirty="0">
+                <a:solidFill>
+                  <a:srgbClr val="00B0F0"/>
+                </a:solidFill>
+              </a:rPr>
+              <a:t>losing</a:t>
+            </a:r>
+          </a:p>
+        </p:txBody>
+      </p:sp>
+    </p:spTree>
+    <p:extLst>
+      <p:ext uri="{BB962C8B-B14F-4D97-AF65-F5344CB8AC3E}">
+        <p14:creationId xmlns:p14="http://schemas.microsoft.com/office/powerpoint/2010/main" val="1641268898"/>
+      </p:ext>
+    </p:extLst>
+  </p:cSld>
+  <p:clrMapOvr>
+    <a:masterClrMapping/>
+  </p:clrMapOvr>
+  <p:timing>
+    <p:tnLst>
+      <p:par>
+        <p:cTn id="1" dur="indefinite" restart="never" nodeType="tmRoot">
+          <p:childTnLst>
+            <p:seq concurrent="1" nextAc="seek">
+              <p:cTn id="2" dur="indefinite" nodeType="mainSeq">
+                <p:childTnLst>
+                  <p:par>
+                    <p:cTn id="3" fill="hold">
+                      <p:stCondLst>
+                        <p:cond delay="indefinite"/>
+                        <p:cond evt="onBegin" delay="0">
+                          <p:tn val="2"/>
+                        </p:cond>
+                      </p:stCondLst>
+                      <p:childTnLst>
+                        <p:par>
+                          <p:cTn id="4" fill="hold">
+                            <p:stCondLst>
+                              <p:cond delay="0"/>
+                            </p:stCondLst>
+                            <p:childTnLst>
+                              <p:par>
+                                <p:cTn id="5" presetID="1" presetClass="entr" presetSubtype="0" fill="hold" nodeType="withEffect">
+                                  <p:stCondLst>
+                                    <p:cond delay="0"/>
+                                  </p:stCondLst>
+                                  <p:childTnLst>
+                                    <p:set>
+                                      <p:cBhvr>
+                                        <p:cTn id="6" dur="1" fill="hold">
+                                          <p:stCondLst>
+                                            <p:cond delay="0"/>
+                                          </p:stCondLst>
+                                        </p:cTn>
+                                        <p:tgtEl>
+                                          <p:spTgt spid="2"/>
+                                        </p:tgtEl>
+                                        <p:attrNameLst>
+                                          <p:attrName>style.visibility</p:attrName>
+                                        </p:attrNameLst>
+                                      </p:cBhvr>
+                                      <p:to>
+                                        <p:strVal val="visible"/>
+                                      </p:to>
+                                    </p:set>
+                                  </p:childTnLst>
+                                </p:cTn>
+                              </p:par>
+                              <p:par>
+                                <p:cTn id="7" presetID="1" presetClass="entr" presetSubtype="0" fill="hold" nodeType="withEffect">
+                                  <p:stCondLst>
+                                    <p:cond delay="0"/>
+                                  </p:stCondLst>
+                                  <p:childTnLst>
+                                    <p:set>
+                                      <p:cBhvr>
+                                        <p:cTn id="8" dur="1" fill="hold">
+                                          <p:stCondLst>
+                                            <p:cond delay="0"/>
+                                          </p:stCondLst>
+                                        </p:cTn>
+                                        <p:tgtEl>
+                                          <p:spTgt spid="4"/>
+                                        </p:tgtEl>
+                                        <p:attrNameLst>
+                                          <p:attrName>style.visibility</p:attrName>
+                                        </p:attrNameLst>
+                                      </p:cBhvr>
+                                      <p:to>
+                                        <p:strVal val="visible"/>
+                                      </p:to>
+                                    </p:set>
+                                  </p:childTnLst>
+                                </p:cTn>
+                              </p:par>
+                              <p:par>
+                                <p:cTn id="9" presetID="1" presetClass="entr" presetSubtype="0" fill="hold" grpId="0" nodeType="withEffect">
+                                  <p:stCondLst>
+                                    <p:cond delay="0"/>
+                                  </p:stCondLst>
+                                  <p:childTnLst>
+                                    <p:set>
+                                      <p:cBhvr>
+                                        <p:cTn id="10" dur="1" fill="hold">
+                                          <p:stCondLst>
+                                            <p:cond delay="0"/>
+                                          </p:stCondLst>
+                                        </p:cTn>
+                                        <p:tgtEl>
+                                          <p:spTgt spid="6"/>
+                                        </p:tgtEl>
+                                        <p:attrNameLst>
+                                          <p:attrName>style.visibility</p:attrName>
+                                        </p:attrNameLst>
+                                      </p:cBhvr>
+                                      <p:to>
+                                        <p:strVal val="visible"/>
+                                      </p:to>
+                                    </p:set>
+                                  </p:childTnLst>
+                                </p:cTn>
+                              </p:par>
+                              <p:par>
+                                <p:cTn id="11" presetID="1" presetClass="entr" presetSubtype="0" fill="hold" grpId="0" nodeType="withEffect">
+                                  <p:stCondLst>
+                                    <p:cond delay="0"/>
+                                  </p:stCondLst>
+                                  <p:childTnLst>
+                                    <p:set>
+                                      <p:cBhvr>
+                                        <p:cTn id="12" dur="1" fill="hold">
+                                          <p:stCondLst>
+                                            <p:cond delay="0"/>
+                                          </p:stCondLst>
+                                        </p:cTn>
+                                        <p:tgtEl>
+                                          <p:spTgt spid="7"/>
+                                        </p:tgtEl>
+                                        <p:attrNameLst>
+                                          <p:attrName>style.visibility</p:attrName>
+                                        </p:attrNameLst>
+                                      </p:cBhvr>
+                                      <p:to>
+                                        <p:strVal val="visible"/>
+                                      </p:to>
+                                    </p:set>
+                                  </p:childTnLst>
+                                </p:cTn>
+                              </p:par>
+                            </p:childTnLst>
+                          </p:cTn>
+                        </p:par>
+                      </p:childTnLst>
+                    </p:cTn>
+                  </p:par>
+                </p:childTnLst>
+              </p:cTn>
+              <p:prevCondLst>
+                <p:cond evt="onPrev" delay="0">
+                  <p:tgtEl>
+                    <p:sldTgt/>
+                  </p:tgtEl>
+                </p:cond>
+              </p:prevCondLst>
+              <p:nextCondLst>
+                <p:cond evt="onNext" delay="0">
+                  <p:tgtEl>
+                    <p:sldTgt/>
+                  </p:tgtEl>
+                </p:cond>
+              </p:nextCondLst>
+            </p:seq>
+          </p:childTnLst>
+        </p:cTn>
+      </p:par>
+    </p:tnLst>
+    <p:bldLst>
+      <p:bldP spid="6" grpId="0"/>
+      <p:bldP spid="7" grpId="0"/>
+    </p:bldLst>
+  </p:timing>
 </p:sld>
 </file>
 

</xml_diff>

<commit_message>
Add presentation for FloPy exercise (#7)
Update to api presentation
</commit_message>
<xml_diff>
--- a/presentations/5-MODFLOW_API.pptx
+++ b/presentations/5-MODFLOW_API.pptx
@@ -4328,7 +4328,7 @@
           <a:noFill/>
           <a:extLst>
             <a:ext uri="{909E8E84-426E-40dd-AFC4-6F175D3DCCD1}">
-              <a14:hiddenFill xmlns="" xmlns:a14="http://schemas.microsoft.com/office/drawing/2010/main">
+              <a14:hiddenFill xmlns:a14="http://schemas.microsoft.com/office/drawing/2010/main" xmlns="">
                 <a:solidFill>
                   <a:srgbClr val="FFFFFF"/>
                 </a:solidFill>
@@ -5044,8 +5044,13 @@
           <a:p>
             <a:r>
               <a:rPr lang="nl-NL" dirty="0"/>
-              <a:t>MODFLOW API</a:t>
-            </a:r>
+              <a:t>MODFLOW API </a:t>
+            </a:r>
+            <a:r>
+              <a:rPr lang="nl-NL" dirty="0" err="1"/>
+              <a:t>exercise</a:t>
+            </a:r>
+            <a:endParaRPr lang="nl-NL" dirty="0"/>
           </a:p>
         </p:txBody>
       </p:sp>

</xml_diff>